<commit_message>
Updating powerpoint to include references
</commit_message>
<xml_diff>
--- a/MATH647ProjectPresentation.pptx
+++ b/MATH647ProjectPresentation.pptx
@@ -14,6 +14,7 @@
     <p:sldId id="263" r:id="rId8"/>
     <p:sldId id="264" r:id="rId9"/>
     <p:sldId id="262" r:id="rId10"/>
+    <p:sldId id="265" r:id="rId11"/>
   </p:sldIdLst>
   <p:sldSz cx="12192000" cy="6858000"/>
   <p:notesSz cx="6858000" cy="9144000"/>
@@ -112,6 +113,11 @@
       </a:defRPr>
     </a:lvl9pPr>
   </p:defaultTextStyle>
+  <p:extLst>
+    <p:ext uri="{EFAFB233-063F-42B5-8137-9DF3F51BA10A}">
+      <p15:sldGuideLst xmlns:p15="http://schemas.microsoft.com/office/powerpoint/2012/main"/>
+    </p:ext>
+  </p:extLst>
 </p:presentation>
 </file>
 
@@ -5769,6 +5775,139 @@
 </p:sld>
 </file>
 
+<file path=ppt/slides/slide10.xml><?xml version="1.0" encoding="utf-8"?>
+<p:sld xmlns:a="http://schemas.openxmlformats.org/drawingml/2006/main" xmlns:r="http://schemas.openxmlformats.org/officeDocument/2006/relationships" xmlns:p="http://schemas.openxmlformats.org/presentationml/2006/main">
+  <p:cSld>
+    <p:spTree>
+      <p:nvGrpSpPr>
+        <p:cNvPr id="1" name=""/>
+        <p:cNvGrpSpPr/>
+        <p:nvPr/>
+      </p:nvGrpSpPr>
+      <p:grpSpPr>
+        <a:xfrm>
+          <a:off x="0" y="0"/>
+          <a:ext cx="0" cy="0"/>
+          <a:chOff x="0" y="0"/>
+          <a:chExt cx="0" cy="0"/>
+        </a:xfrm>
+      </p:grpSpPr>
+      <p:sp>
+        <p:nvSpPr>
+          <p:cNvPr id="2" name="Title 1">
+            <a:extLst>
+              <a:ext uri="{FF2B5EF4-FFF2-40B4-BE49-F238E27FC236}">
+                <a16:creationId xmlns:a16="http://schemas.microsoft.com/office/drawing/2014/main" id="{1C2A8085-0B1A-46B3-8DE0-FDACED60DE14}"/>
+              </a:ext>
+            </a:extLst>
+          </p:cNvPr>
+          <p:cNvSpPr>
+            <a:spLocks noGrp="1"/>
+          </p:cNvSpPr>
+          <p:nvPr>
+            <p:ph type="title"/>
+          </p:nvPr>
+        </p:nvSpPr>
+        <p:spPr>
+          <a:xfrm>
+            <a:off x="685800" y="764373"/>
+            <a:ext cx="8610600" cy="1293028"/>
+          </a:xfrm>
+        </p:spPr>
+        <p:txBody>
+          <a:bodyPr/>
+          <a:lstStyle/>
+          <a:p>
+            <a:pPr algn="l"/>
+            <a:r>
+              <a:rPr lang="en-US" dirty="0"/>
+              <a:t>References</a:t>
+            </a:r>
+          </a:p>
+        </p:txBody>
+      </p:sp>
+      <p:sp>
+        <p:nvSpPr>
+          <p:cNvPr id="3" name="Content Placeholder 2">
+            <a:extLst>
+              <a:ext uri="{FF2B5EF4-FFF2-40B4-BE49-F238E27FC236}">
+                <a16:creationId xmlns:a16="http://schemas.microsoft.com/office/drawing/2014/main" id="{3C2D6736-3245-4E90-996B-2D7BE901FFC8}"/>
+              </a:ext>
+            </a:extLst>
+          </p:cNvPr>
+          <p:cNvSpPr>
+            <a:spLocks noGrp="1"/>
+          </p:cNvSpPr>
+          <p:nvPr>
+            <p:ph idx="1"/>
+          </p:nvPr>
+        </p:nvSpPr>
+        <p:spPr/>
+        <p:txBody>
+          <a:bodyPr/>
+          <a:lstStyle/>
+          <a:p>
+            <a:r>
+              <a:rPr lang="en-US" dirty="0" err="1"/>
+              <a:t>Asmar</a:t>
+            </a:r>
+            <a:r>
+              <a:rPr lang="en-US" dirty="0"/>
+              <a:t>, N. Partial Differential Equations with Fourier Series and Boundary Value Problems, 3</a:t>
+            </a:r>
+            <a:r>
+              <a:rPr lang="en-US" baseline="30000" dirty="0"/>
+              <a:t>rd</a:t>
+            </a:r>
+            <a:r>
+              <a:rPr lang="en-US" dirty="0"/>
+              <a:t> ed. (2016). New York, NY. </a:t>
+            </a:r>
+            <a:r>
+              <a:rPr lang="en-US"/>
+              <a:t>Dover Publications.</a:t>
+            </a:r>
+          </a:p>
+          <a:p>
+            <a:r>
+              <a:rPr lang="en-US" dirty="0"/>
+              <a:t>Burden, R. and </a:t>
+            </a:r>
+            <a:r>
+              <a:rPr lang="en-US" dirty="0" err="1"/>
+              <a:t>Faires</a:t>
+            </a:r>
+            <a:r>
+              <a:rPr lang="en-US" dirty="0"/>
+              <a:t>, J. Numerical Analysis, 7</a:t>
+            </a:r>
+            <a:r>
+              <a:rPr lang="en-US" baseline="30000" dirty="0"/>
+              <a:t>th</a:t>
+            </a:r>
+            <a:r>
+              <a:rPr lang="en-US" dirty="0"/>
+              <a:t> ed. (2001). Pacific Grove, CA. Wadsworth Group.</a:t>
+            </a:r>
+          </a:p>
+          <a:p>
+            <a:endParaRPr lang="en-US" dirty="0"/>
+          </a:p>
+        </p:txBody>
+      </p:sp>
+    </p:spTree>
+    <p:extLst>
+      <p:ext uri="{BB962C8B-B14F-4D97-AF65-F5344CB8AC3E}">
+        <p14:creationId xmlns:p14="http://schemas.microsoft.com/office/powerpoint/2010/main" val="656021668"/>
+      </p:ext>
+    </p:extLst>
+  </p:cSld>
+  <p:clrMapOvr>
+    <a:masterClrMapping/>
+  </p:clrMapOvr>
+</p:sld>
+</file>
+
 <file path=ppt/slides/slide2.xml><?xml version="1.0" encoding="utf-8"?>
 <p:sld xmlns:a="http://schemas.openxmlformats.org/drawingml/2006/main" xmlns:r="http://schemas.openxmlformats.org/officeDocument/2006/relationships" xmlns:p="http://schemas.openxmlformats.org/presentationml/2006/main">
   <p:cSld>
@@ -5998,7 +6137,7 @@
             </a:r>
             <a:r>
               <a:rPr lang="en-US" dirty="0"/>
-              <a:t>, 2 ed., pg. 704), the forward finite difference method is given by </a:t>
+              <a:t>, 7 ed., pg. 704), the forward finite difference method is given by </a:t>
             </a:r>
           </a:p>
           <a:p>
@@ -7505,14 +7644,13 @@
           </a:p>
           <a:p>
             <a:r>
-              <a:rPr lang="en-US" dirty="0" err="1"/>
+              <a:rPr lang="en-US" sz="1600" dirty="0" err="1"/>
               <a:t>Github</a:t>
             </a:r>
             <a:r>
-              <a:rPr lang="en-US"/>
-              <a:t>:</a:t>
-            </a:r>
-            <a:endParaRPr lang="en-US" dirty="0"/>
+              <a:rPr lang="en-US" sz="1600" dirty="0"/>
+              <a:t>: https://github.com/ThomasGartman/MATH647ComputerProject</a:t>
+            </a:r>
           </a:p>
         </p:txBody>
       </p:sp>

</xml_diff>